<commit_message>
added mentimeter code and fixed font issues
</commit_message>
<xml_diff>
--- a/02- Regression models and linear prediction/ML4NuerScience_Linear_models.pptx
+++ b/02- Regression models and linear prediction/ML4NuerScience_Linear_models.pptx
@@ -358,7 +358,7 @@
               <a:pPr>
                 <a:defRPr/>
               </a:pPr>
-              <a:t>14/01/2023</a:t>
+              <a:t>16/01/2023</a:t>
             </a:fld>
             <a:endParaRPr lang="en-GB" altLang="en-US"/>
           </a:p>
@@ -592,7 +592,7 @@
               <a:pPr>
                 <a:defRPr/>
               </a:pPr>
-              <a:t>14/01/2023</a:t>
+              <a:t>16/01/2023</a:t>
             </a:fld>
             <a:endParaRPr lang="en-GB" altLang="en-US"/>
           </a:p>
@@ -1582,7 +1582,7 @@
               <a:pPr>
                 <a:defRPr/>
               </a:pPr>
-              <a:t>14/01/2023</a:t>
+              <a:t>16/01/2023</a:t>
             </a:fld>
             <a:endParaRPr lang="en-GB" altLang="en-US"/>
           </a:p>
@@ -1845,7 +1845,7 @@
               <a:pPr>
                 <a:defRPr/>
               </a:pPr>
-              <a:t>14/01/2023</a:t>
+              <a:t>16/01/2023</a:t>
             </a:fld>
             <a:endParaRPr lang="en-GB" altLang="en-US"/>
           </a:p>
@@ -2083,7 +2083,7 @@
               <a:pPr>
                 <a:defRPr/>
               </a:pPr>
-              <a:t>14/01/2023</a:t>
+              <a:t>16/01/2023</a:t>
             </a:fld>
             <a:endParaRPr lang="en-GB" altLang="en-US"/>
           </a:p>
@@ -2417,7 +2417,7 @@
               <a:pPr>
                 <a:defRPr/>
               </a:pPr>
-              <a:t>14/01/2023</a:t>
+              <a:t>16/01/2023</a:t>
             </a:fld>
             <a:endParaRPr lang="en-GB" altLang="en-US"/>
           </a:p>
@@ -2890,7 +2890,7 @@
               <a:pPr>
                 <a:defRPr/>
               </a:pPr>
-              <a:t>14/01/2023</a:t>
+              <a:t>16/01/2023</a:t>
             </a:fld>
             <a:endParaRPr lang="en-GB" altLang="en-US"/>
           </a:p>
@@ -3054,7 +3054,7 @@
               <a:pPr>
                 <a:defRPr/>
               </a:pPr>
-              <a:t>14/01/2023</a:t>
+              <a:t>16/01/2023</a:t>
             </a:fld>
             <a:endParaRPr lang="en-GB" altLang="en-US"/>
           </a:p>
@@ -3195,7 +3195,7 @@
               <a:pPr>
                 <a:defRPr/>
               </a:pPr>
-              <a:t>14/01/2023</a:t>
+              <a:t>16/01/2023</a:t>
             </a:fld>
             <a:endParaRPr lang="en-GB" altLang="en-US"/>
           </a:p>
@@ -3495,7 +3495,7 @@
               <a:pPr>
                 <a:defRPr/>
               </a:pPr>
-              <a:t>14/01/2023</a:t>
+              <a:t>16/01/2023</a:t>
             </a:fld>
             <a:endParaRPr lang="en-GB" altLang="en-US"/>
           </a:p>
@@ -3821,7 +3821,7 @@
               <a:pPr>
                 <a:defRPr/>
               </a:pPr>
-              <a:t>14/01/2023</a:t>
+              <a:t>16/01/2023</a:t>
             </a:fld>
             <a:endParaRPr lang="en-GB" altLang="en-US"/>
           </a:p>
@@ -7690,8 +7690,8 @@
           </a:p>
         </p:txBody>
       </p:sp>
-      <mc:AlternateContent xmlns:mc="http://schemas.openxmlformats.org/markup-compatibility/2006" xmlns:a14="http://schemas.microsoft.com/office/drawing/2010/main">
-        <mc:Choice Requires="a14">
+      <mc:AlternateContent xmlns:mc="http://schemas.openxmlformats.org/markup-compatibility/2006">
+        <mc:Choice xmlns:a14="http://schemas.microsoft.com/office/drawing/2010/main" Requires="a14">
           <p:sp>
             <p:nvSpPr>
               <p:cNvPr id="3" name="Content Placeholder 2">
@@ -7719,7 +7719,6 @@
                       <a:srgbClr val="212529"/>
                     </a:solidFill>
                     <a:effectLst/>
-                    <a:latin typeface="-apple-system"/>
                   </a:rPr>
                   <a:t>A Linear Regression model uses a </a:t>
                 </a:r>
@@ -7729,7 +7728,6 @@
                       <a:srgbClr val="FF0000"/>
                     </a:solidFill>
                     <a:effectLst/>
-                    <a:latin typeface="-apple-system"/>
                   </a:rPr>
                   <a:t>linear model </a:t>
                 </a:r>
@@ -7739,7 +7737,6 @@
                       <a:srgbClr val="212529"/>
                     </a:solidFill>
                     <a:effectLst/>
-                    <a:latin typeface="-apple-system"/>
                   </a:rPr>
                   <a:t>with coefficients </a:t>
                 </a:r>
@@ -7749,7 +7746,6 @@
                       <a:srgbClr val="212529"/>
                     </a:solidFill>
                     <a:effectLst/>
-                    <a:latin typeface="Cambria Math" panose="02040503050406030204" pitchFamily="18" charset="0"/>
                   </a:rPr>
                 </a:br>
                 <a14:m>
@@ -7842,7 +7838,6 @@
                       <a:srgbClr val="212529"/>
                     </a:solidFill>
                     <a:effectLst/>
-                    <a:latin typeface="-apple-system"/>
                   </a:rPr>
                   <a:t> to minimise the residual sum of squares between the observed targets in the dataset, and the targets that are predicted by the linear approximation used in the model.</a:t>
                 </a:r>
@@ -7851,7 +7846,7 @@
             </p:txBody>
           </p:sp>
         </mc:Choice>
-        <mc:Fallback xmlns="">
+        <mc:Fallback>
           <p:sp>
             <p:nvSpPr>
               <p:cNvPr id="3" name="Content Placeholder 2">
@@ -14654,8 +14649,8 @@
           </a:p>
         </p:txBody>
       </p:sp>
-      <mc:AlternateContent xmlns:mc="http://schemas.openxmlformats.org/markup-compatibility/2006" xmlns:a14="http://schemas.microsoft.com/office/drawing/2010/main">
-        <mc:Choice Requires="a14">
+      <mc:AlternateContent xmlns:mc="http://schemas.openxmlformats.org/markup-compatibility/2006">
+        <mc:Choice xmlns:a14="http://schemas.microsoft.com/office/drawing/2010/main" Requires="a14">
           <p:sp>
             <p:nvSpPr>
               <p:cNvPr id="3" name="Content Placeholder 2">
@@ -14681,7 +14676,24 @@
                   <a:rPr lang="en-GB" dirty="0">
                     <a:effectLst/>
                   </a:rPr>
-                  <a:t>The idea is simple: we split the training data into K folds; then, for each fold </a:t>
+                  <a:t>The idea is simple: we split the training data into </a:t>
+                </a:r>
+                <a14:m>
+                  <m:oMath xmlns:m="http://schemas.openxmlformats.org/officeDocument/2006/math">
+                    <m:r>
+                      <a:rPr lang="en-GB" i="1" dirty="0" smtClean="0">
+                        <a:effectLst/>
+                        <a:latin typeface="Cambria Math" panose="02040503050406030204" pitchFamily="18" charset="0"/>
+                      </a:rPr>
+                      <m:t>𝐾</m:t>
+                    </m:r>
+                  </m:oMath>
+                </a14:m>
+                <a:r>
+                  <a:rPr lang="en-GB" dirty="0">
+                    <a:effectLst/>
+                  </a:rPr>
+                  <a:t> folds; then, for each fold </a:t>
                 </a:r>
                 <a14:m>
                   <m:oMath xmlns:m="http://schemas.openxmlformats.org/officeDocument/2006/math">
@@ -14752,7 +14764,7 @@
             </p:txBody>
           </p:sp>
         </mc:Choice>
-        <mc:Fallback xmlns="">
+        <mc:Fallback>
           <p:sp>
             <p:nvSpPr>
               <p:cNvPr id="3" name="Content Placeholder 2">

</xml_diff>